<commit_message>
Another minor change in PPT
</commit_message>
<xml_diff>
--- a/SIM GAME.pptx
+++ b/SIM GAME.pptx
@@ -6638,7 +6638,7 @@
             </a:pPr>
             <a:r>
               <a:rPr lang="en-US" sz="3200" dirty="0"/>
-              <a:t>Reward:</a:t>
+              <a:t>Punish:</a:t>
             </a:r>
           </a:p>
           <a:p>
@@ -7078,12 +7078,9 @@
 </file>
 
 <file path=customXml/item1.xml><?xml version="1.0" encoding="utf-8"?>
-<?mso-contentType ?>
-<FormTemplates xmlns="http://schemas.microsoft.com/sharepoint/v3/contenttype/forms">
-  <Display>DocumentLibraryForm</Display>
-  <Edit>DocumentLibraryForm</Edit>
-  <New>DocumentLibraryForm</New>
-</FormTemplates>
+<p:properties xmlns:p="http://schemas.microsoft.com/office/2006/metadata/properties" xmlns:xsi="http://www.w3.org/2001/XMLSchema-instance" xmlns:pc="http://schemas.microsoft.com/office/infopath/2007/PartnerControls">
+  <documentManagement/>
+</p:properties>
 </file>
 
 <file path=customXml/item2.xml><?xml version="1.0" encoding="utf-8"?>
@@ -7304,15 +7301,19 @@
 </file>
 
 <file path=customXml/item3.xml><?xml version="1.0" encoding="utf-8"?>
-<p:properties xmlns:p="http://schemas.microsoft.com/office/2006/metadata/properties" xmlns:xsi="http://www.w3.org/2001/XMLSchema-instance" xmlns:pc="http://schemas.microsoft.com/office/infopath/2007/PartnerControls">
-  <documentManagement/>
-</p:properties>
+<?mso-contentType ?>
+<FormTemplates xmlns="http://schemas.microsoft.com/sharepoint/v3/contenttype/forms">
+  <Display>DocumentLibraryForm</Display>
+  <Edit>DocumentLibraryForm</Edit>
+  <New>DocumentLibraryForm</New>
+</FormTemplates>
 </file>
 
 <file path=customXml/itemProps1.xml><?xml version="1.0" encoding="utf-8"?>
-<ds:datastoreItem xmlns:ds="http://schemas.openxmlformats.org/officeDocument/2006/customXml" ds:itemID="{D14F48EF-3D5D-4FE6-A92A-677EF26D9C20}">
+<ds:datastoreItem xmlns:ds="http://schemas.openxmlformats.org/officeDocument/2006/customXml" ds:itemID="{AF8ED2A9-2C4E-4FA7-8306-C9CE2AEF27BE}">
   <ds:schemaRefs>
-    <ds:schemaRef ds:uri="http://schemas.microsoft.com/sharepoint/v3/contenttype/forms"/>
+    <ds:schemaRef ds:uri="http://schemas.microsoft.com/office/2006/metadata/properties"/>
+    <ds:schemaRef ds:uri="http://schemas.microsoft.com/office/infopath/2007/PartnerControls"/>
   </ds:schemaRefs>
 </ds:datastoreItem>
 </file>
@@ -7337,10 +7338,9 @@
 </file>
 
 <file path=customXml/itemProps3.xml><?xml version="1.0" encoding="utf-8"?>
-<ds:datastoreItem xmlns:ds="http://schemas.openxmlformats.org/officeDocument/2006/customXml" ds:itemID="{AF8ED2A9-2C4E-4FA7-8306-C9CE2AEF27BE}">
+<ds:datastoreItem xmlns:ds="http://schemas.openxmlformats.org/officeDocument/2006/customXml" ds:itemID="{D14F48EF-3D5D-4FE6-A92A-677EF26D9C20}">
   <ds:schemaRefs>
-    <ds:schemaRef ds:uri="http://schemas.microsoft.com/office/2006/metadata/properties"/>
-    <ds:schemaRef ds:uri="http://schemas.microsoft.com/office/infopath/2007/PartnerControls"/>
+    <ds:schemaRef ds:uri="http://schemas.microsoft.com/sharepoint/v3/contenttype/forms"/>
   </ds:schemaRefs>
 </ds:datastoreItem>
 </file>
</xml_diff>